<commit_message>
Update for .NET Core 3.1 final release.
</commit_message>
<xml_diff>
--- a/Blazor - No JavaScript.pptx
+++ b/Blazor - No JavaScript.pptx
@@ -16,12 +16,13 @@
     <p:sldId id="262" r:id="rId10"/>
     <p:sldId id="263" r:id="rId11"/>
     <p:sldId id="270" r:id="rId12"/>
-    <p:sldId id="272" r:id="rId13"/>
-    <p:sldId id="264" r:id="rId14"/>
-    <p:sldId id="271" r:id="rId15"/>
-    <p:sldId id="274" r:id="rId16"/>
-    <p:sldId id="265" r:id="rId17"/>
-    <p:sldId id="273" r:id="rId18"/>
+    <p:sldId id="275" r:id="rId13"/>
+    <p:sldId id="272" r:id="rId14"/>
+    <p:sldId id="264" r:id="rId15"/>
+    <p:sldId id="271" r:id="rId16"/>
+    <p:sldId id="274" r:id="rId17"/>
+    <p:sldId id="265" r:id="rId18"/>
+    <p:sldId id="273" r:id="rId19"/>
   </p:sldIdLst>
   <p:sldSz cx="12192000" cy="6858000"/>
   <p:notesSz cx="6858000" cy="9144000"/>
@@ -772,7 +773,7 @@
             <a:fld id="{B61BEF0D-F0BB-DE4B-95CE-6DB70DBA9567}" type="datetimeFigureOut">
               <a:rPr lang="en-US" dirty="0"/>
               <a:pPr/>
-              <a:t>8/8/2019</a:t>
+              <a:t>7/31/2020</a:t>
             </a:fld>
             <a:endParaRPr lang="en-US" dirty="0"/>
           </a:p>
@@ -1103,7 +1104,7 @@
             <a:fld id="{B61BEF0D-F0BB-DE4B-95CE-6DB70DBA9567}" type="datetimeFigureOut">
               <a:rPr lang="en-US" dirty="0"/>
               <a:pPr/>
-              <a:t>8/8/2019</a:t>
+              <a:t>7/31/2020</a:t>
             </a:fld>
             <a:endParaRPr lang="en-US" dirty="0"/>
           </a:p>
@@ -1378,7 +1379,7 @@
             <a:fld id="{B61BEF0D-F0BB-DE4B-95CE-6DB70DBA9567}" type="datetimeFigureOut">
               <a:rPr lang="en-US" dirty="0"/>
               <a:pPr/>
-              <a:t>8/8/2019</a:t>
+              <a:t>7/31/2020</a:t>
             </a:fld>
             <a:endParaRPr lang="en-US" dirty="0"/>
           </a:p>
@@ -1943,7 +1944,7 @@
             <a:fld id="{B61BEF0D-F0BB-DE4B-95CE-6DB70DBA9567}" type="datetimeFigureOut">
               <a:rPr lang="en-US" dirty="0"/>
               <a:pPr/>
-              <a:t>8/8/2019</a:t>
+              <a:t>7/31/2020</a:t>
             </a:fld>
             <a:endParaRPr lang="en-US" dirty="0"/>
           </a:p>
@@ -2218,7 +2219,7 @@
             <a:fld id="{B61BEF0D-F0BB-DE4B-95CE-6DB70DBA9567}" type="datetimeFigureOut">
               <a:rPr lang="en-US" dirty="0"/>
               <a:pPr/>
-              <a:t>8/8/2019</a:t>
+              <a:t>7/31/2020</a:t>
             </a:fld>
             <a:endParaRPr lang="en-US" dirty="0"/>
           </a:p>
@@ -2777,7 +2778,7 @@
             <a:fld id="{B61BEF0D-F0BB-DE4B-95CE-6DB70DBA9567}" type="datetimeFigureOut">
               <a:rPr lang="en-US" dirty="0"/>
               <a:pPr/>
-              <a:t>8/8/2019</a:t>
+              <a:t>7/31/2020</a:t>
             </a:fld>
             <a:endParaRPr lang="en-US" dirty="0"/>
           </a:p>
@@ -3101,7 +3102,7 @@
             <a:fld id="{B61BEF0D-F0BB-DE4B-95CE-6DB70DBA9567}" type="datetimeFigureOut">
               <a:rPr lang="en-US" dirty="0"/>
               <a:pPr/>
-              <a:t>8/8/2019</a:t>
+              <a:t>7/31/2020</a:t>
             </a:fld>
             <a:endParaRPr lang="en-US" dirty="0"/>
           </a:p>
@@ -3275,7 +3276,7 @@
             <a:fld id="{B61BEF0D-F0BB-DE4B-95CE-6DB70DBA9567}" type="datetimeFigureOut">
               <a:rPr lang="en-US" dirty="0"/>
               <a:pPr/>
-              <a:t>8/8/2019</a:t>
+              <a:t>7/31/2020</a:t>
             </a:fld>
             <a:endParaRPr lang="en-US" dirty="0"/>
           </a:p>
@@ -3510,7 +3511,7 @@
             <a:fld id="{B61BEF0D-F0BB-DE4B-95CE-6DB70DBA9567}" type="datetimeFigureOut">
               <a:rPr lang="en-US" dirty="0"/>
               <a:pPr/>
-              <a:t>8/8/2019</a:t>
+              <a:t>7/31/2020</a:t>
             </a:fld>
             <a:endParaRPr lang="en-US" dirty="0"/>
           </a:p>
@@ -3707,7 +3708,7 @@
             <a:fld id="{B61BEF0D-F0BB-DE4B-95CE-6DB70DBA9567}" type="datetimeFigureOut">
               <a:rPr lang="en-US" dirty="0"/>
               <a:pPr/>
-              <a:t>8/8/2019</a:t>
+              <a:t>7/31/2020</a:t>
             </a:fld>
             <a:endParaRPr lang="en-US" dirty="0"/>
           </a:p>
@@ -3980,7 +3981,7 @@
             <a:fld id="{B61BEF0D-F0BB-DE4B-95CE-6DB70DBA9567}" type="datetimeFigureOut">
               <a:rPr lang="en-US" dirty="0"/>
               <a:pPr/>
-              <a:t>8/8/2019</a:t>
+              <a:t>7/31/2020</a:t>
             </a:fld>
             <a:endParaRPr lang="en-US" dirty="0"/>
           </a:p>
@@ -4243,7 +4244,7 @@
             <a:fld id="{B61BEF0D-F0BB-DE4B-95CE-6DB70DBA9567}" type="datetimeFigureOut">
               <a:rPr lang="en-US" dirty="0"/>
               <a:pPr/>
-              <a:t>8/8/2019</a:t>
+              <a:t>7/31/2020</a:t>
             </a:fld>
             <a:endParaRPr lang="en-US" dirty="0"/>
           </a:p>
@@ -4614,7 +4615,7 @@
             <a:fld id="{B61BEF0D-F0BB-DE4B-95CE-6DB70DBA9567}" type="datetimeFigureOut">
               <a:rPr lang="en-US" dirty="0"/>
               <a:pPr/>
-              <a:t>8/8/2019</a:t>
+              <a:t>7/31/2020</a:t>
             </a:fld>
             <a:endParaRPr lang="en-US" dirty="0"/>
           </a:p>
@@ -4759,7 +4760,7 @@
             <a:fld id="{B61BEF0D-F0BB-DE4B-95CE-6DB70DBA9567}" type="datetimeFigureOut">
               <a:rPr lang="en-US" dirty="0"/>
               <a:pPr/>
-              <a:t>8/8/2019</a:t>
+              <a:t>7/31/2020</a:t>
             </a:fld>
             <a:endParaRPr lang="en-US" dirty="0"/>
           </a:p>
@@ -4881,7 +4882,7 @@
             <a:fld id="{B61BEF0D-F0BB-DE4B-95CE-6DB70DBA9567}" type="datetimeFigureOut">
               <a:rPr lang="en-US" dirty="0"/>
               <a:pPr/>
-              <a:t>8/8/2019</a:t>
+              <a:t>7/31/2020</a:t>
             </a:fld>
             <a:endParaRPr lang="en-US" dirty="0"/>
           </a:p>
@@ -5163,7 +5164,7 @@
             <a:fld id="{B61BEF0D-F0BB-DE4B-95CE-6DB70DBA9567}" type="datetimeFigureOut">
               <a:rPr lang="en-US" dirty="0"/>
               <a:pPr/>
-              <a:t>8/8/2019</a:t>
+              <a:t>7/31/2020</a:t>
             </a:fld>
             <a:endParaRPr lang="en-US" dirty="0"/>
           </a:p>
@@ -5484,7 +5485,7 @@
             <a:fld id="{B61BEF0D-F0BB-DE4B-95CE-6DB70DBA9567}" type="datetimeFigureOut">
               <a:rPr lang="en-US" dirty="0"/>
               <a:pPr/>
-              <a:t>8/8/2019</a:t>
+              <a:t>7/31/2020</a:t>
             </a:fld>
             <a:endParaRPr lang="en-US" dirty="0"/>
           </a:p>
@@ -5695,7 +5696,7 @@
             <a:fld id="{B61BEF0D-F0BB-DE4B-95CE-6DB70DBA9567}" type="datetimeFigureOut">
               <a:rPr lang="en-US" dirty="0"/>
               <a:pPr/>
-              <a:t>8/8/2019</a:t>
+              <a:t>7/31/2020</a:t>
             </a:fld>
             <a:endParaRPr lang="en-US" dirty="0"/>
           </a:p>
@@ -6274,7 +6275,7 @@
             <a:pPr algn="l"/>
             <a:r>
               <a:rPr lang="en-US" dirty="0"/>
-              <a:t>Date: 2019-08-08</a:t>
+              <a:t>Date: 2020-07-31</a:t>
             </a:r>
           </a:p>
         </p:txBody>
@@ -6745,126 +6746,49 @@
           <a:p>
             <a:r>
               <a:rPr lang="en-US" dirty="0"/>
-              <a:t>A work in progress</a:t>
+              <a:t>Creating a new </a:t>
+            </a:r>
+            <a:r>
+              <a:rPr lang="en-US" dirty="0" err="1"/>
+              <a:t>blazor</a:t>
+            </a:r>
+            <a:r>
+              <a:rPr lang="en-US" dirty="0"/>
+              <a:t> app</a:t>
             </a:r>
           </a:p>
         </p:txBody>
       </p:sp>
-      <p:sp>
-        <p:nvSpPr>
-          <p:cNvPr id="3" name="Content Placeholder 2">
+      <p:pic>
+        <p:nvPicPr>
+          <p:cNvPr id="6" name="Picture 5">
             <a:extLst>
               <a:ext uri="{FF2B5EF4-FFF2-40B4-BE49-F238E27FC236}">
-                <a16:creationId xmlns:a16="http://schemas.microsoft.com/office/drawing/2014/main" id="{42F6801F-FE79-48AF-B6F1-0B84C4CCE9FE}"/>
+                <a16:creationId xmlns:a16="http://schemas.microsoft.com/office/drawing/2014/main" id="{D2F511F3-6E96-40E0-A9F3-64388A6490E1}"/>
               </a:ext>
             </a:extLst>
           </p:cNvPr>
-          <p:cNvSpPr>
-            <a:spLocks noGrp="1"/>
-          </p:cNvSpPr>
-          <p:nvPr>
-            <p:ph idx="1"/>
-          </p:nvPr>
-        </p:nvSpPr>
+          <p:cNvPicPr>
+            <a:picLocks noChangeAspect="1"/>
+          </p:cNvPicPr>
+          <p:nvPr/>
+        </p:nvPicPr>
+        <p:blipFill>
+          <a:blip r:embed="rId2"/>
+          <a:stretch>
+            <a:fillRect/>
+          </a:stretch>
+        </p:blipFill>
         <p:spPr>
           <a:xfrm>
-            <a:off x="685801" y="2142067"/>
-            <a:ext cx="10131425" cy="3736219"/>
+            <a:off x="2463386" y="1820437"/>
+            <a:ext cx="6576253" cy="4521174"/>
           </a:xfrm>
+          <a:prstGeom prst="rect">
+            <a:avLst/>
+          </a:prstGeom>
         </p:spPr>
-        <p:txBody>
-          <a:bodyPr>
-            <a:normAutofit lnSpcReduction="10000"/>
-          </a:bodyPr>
-          <a:lstStyle/>
-          <a:p>
-            <a:r>
-              <a:rPr lang="en-US" sz="2400" dirty="0"/>
-              <a:t>Must install Visual Studio 2019 Preview 16.3.0</a:t>
-            </a:r>
-          </a:p>
-          <a:p>
-            <a:r>
-              <a:rPr lang="en-US" sz="2400" dirty="0"/>
-              <a:t>Blazor last release: July 23, 2019 – Preview 7</a:t>
-            </a:r>
-          </a:p>
-          <a:p>
-            <a:pPr lvl="1"/>
-            <a:r>
-              <a:rPr lang="en-US" sz="2000" dirty="0"/>
-              <a:t>Releasing about every month.</a:t>
-            </a:r>
-          </a:p>
-          <a:p>
-            <a:pPr lvl="1"/>
-            <a:r>
-              <a:rPr lang="en-US" sz="2000" dirty="0">
-                <a:hlinkClick r:id="rId2"/>
-              </a:rPr>
-              <a:t>https://devblogs.microsoft.com/aspnet/asp-net-core-and-blazor-updates-in-net-core-3-0-preview-7/</a:t>
-            </a:r>
-            <a:endParaRPr lang="en-US" sz="2000" dirty="0"/>
-          </a:p>
-          <a:p>
-            <a:pPr lvl="1"/>
-            <a:r>
-              <a:rPr lang="en-US" sz="2000" dirty="0"/>
-              <a:t>Get latest client templates:</a:t>
-            </a:r>
-          </a:p>
-          <a:p>
-            <a:pPr marL="457200" lvl="1" indent="0">
-              <a:buNone/>
-            </a:pPr>
-            <a:r>
-              <a:rPr lang="en-US" sz="2000" dirty="0"/>
-              <a:t>	&gt; dotnet new -</a:t>
-            </a:r>
-            <a:r>
-              <a:rPr lang="en-US" sz="2000" dirty="0" err="1"/>
-              <a:t>i</a:t>
-            </a:r>
-            <a:r>
-              <a:rPr lang="en-US" sz="2000" dirty="0"/>
-              <a:t> </a:t>
-            </a:r>
-            <a:r>
-              <a:rPr lang="en-US" sz="2000" dirty="0" err="1"/>
-              <a:t>Microsoft.AspNetCore.Blazor.Templates</a:t>
-            </a:r>
-            <a:r>
-              <a:rPr lang="en-US" sz="2000" dirty="0"/>
-              <a:t>::3.0.0-preview7.19365.7</a:t>
-            </a:r>
-          </a:p>
-          <a:p>
-            <a:endParaRPr lang="en-US" sz="2200" dirty="0"/>
-          </a:p>
-          <a:p>
-            <a:r>
-              <a:rPr lang="en-US" sz="2200" dirty="0"/>
-              <a:t>Currently working on </a:t>
-            </a:r>
-            <a:r>
-              <a:rPr lang="en-US" sz="2200" dirty="0" err="1"/>
-              <a:t>WebSockets</a:t>
-            </a:r>
-            <a:r>
-              <a:rPr lang="en-US" sz="2200" dirty="0"/>
-              <a:t> implementation so </a:t>
-            </a:r>
-            <a:r>
-              <a:rPr lang="en-US" sz="2200" dirty="0" err="1"/>
-              <a:t>SignalR</a:t>
-            </a:r>
-            <a:r>
-              <a:rPr lang="en-US" sz="2200" dirty="0"/>
-              <a:t> can function.</a:t>
-            </a:r>
-          </a:p>
-        </p:txBody>
-      </p:sp>
+      </p:pic>
     </p:spTree>
     <p:extLst>
       <p:ext uri="{BB962C8B-B14F-4D97-AF65-F5344CB8AC3E}">
@@ -6879,6 +6803,102 @@
 </file>
 
 <file path=ppt/slides/slide12.xml><?xml version="1.0" encoding="utf-8"?>
+<p:sld xmlns:a="http://schemas.openxmlformats.org/drawingml/2006/main" xmlns:r="http://schemas.openxmlformats.org/officeDocument/2006/relationships" xmlns:p="http://schemas.openxmlformats.org/presentationml/2006/main">
+  <p:cSld>
+    <p:spTree>
+      <p:nvGrpSpPr>
+        <p:cNvPr id="1" name=""/>
+        <p:cNvGrpSpPr/>
+        <p:nvPr/>
+      </p:nvGrpSpPr>
+      <p:grpSpPr>
+        <a:xfrm>
+          <a:off x="0" y="0"/>
+          <a:ext cx="0" cy="0"/>
+          <a:chOff x="0" y="0"/>
+          <a:chExt cx="0" cy="0"/>
+        </a:xfrm>
+      </p:grpSpPr>
+      <p:sp>
+        <p:nvSpPr>
+          <p:cNvPr id="2" name="Title 1">
+            <a:extLst>
+              <a:ext uri="{FF2B5EF4-FFF2-40B4-BE49-F238E27FC236}">
+                <a16:creationId xmlns:a16="http://schemas.microsoft.com/office/drawing/2014/main" id="{4A87D5F7-A925-4733-AA28-7E07848649C1}"/>
+              </a:ext>
+            </a:extLst>
+          </p:cNvPr>
+          <p:cNvSpPr>
+            <a:spLocks noGrp="1"/>
+          </p:cNvSpPr>
+          <p:nvPr>
+            <p:ph type="title"/>
+          </p:nvPr>
+        </p:nvSpPr>
+        <p:spPr/>
+        <p:txBody>
+          <a:bodyPr/>
+          <a:lstStyle/>
+          <a:p>
+            <a:r>
+              <a:rPr lang="en-US" dirty="0"/>
+              <a:t>Creating a new </a:t>
+            </a:r>
+            <a:r>
+              <a:rPr lang="en-US" dirty="0" err="1"/>
+              <a:t>blazor</a:t>
+            </a:r>
+            <a:r>
+              <a:rPr lang="en-US" dirty="0"/>
+              <a:t> app</a:t>
+            </a:r>
+          </a:p>
+        </p:txBody>
+      </p:sp>
+      <p:pic>
+        <p:nvPicPr>
+          <p:cNvPr id="3" name="Picture 2">
+            <a:extLst>
+              <a:ext uri="{FF2B5EF4-FFF2-40B4-BE49-F238E27FC236}">
+                <a16:creationId xmlns:a16="http://schemas.microsoft.com/office/drawing/2014/main" id="{ACA54A5C-862F-4B2F-860B-C9676D2698F4}"/>
+              </a:ext>
+            </a:extLst>
+          </p:cNvPr>
+          <p:cNvPicPr>
+            <a:picLocks noChangeAspect="1"/>
+          </p:cNvPicPr>
+          <p:nvPr/>
+        </p:nvPicPr>
+        <p:blipFill>
+          <a:blip r:embed="rId2"/>
+          <a:stretch>
+            <a:fillRect/>
+          </a:stretch>
+        </p:blipFill>
+        <p:spPr>
+          <a:xfrm>
+            <a:off x="2365296" y="1822288"/>
+            <a:ext cx="6741085" cy="4348849"/>
+          </a:xfrm>
+          <a:prstGeom prst="rect">
+            <a:avLst/>
+          </a:prstGeom>
+        </p:spPr>
+      </p:pic>
+    </p:spTree>
+    <p:extLst>
+      <p:ext uri="{BB962C8B-B14F-4D97-AF65-F5344CB8AC3E}">
+        <p14:creationId xmlns:p14="http://schemas.microsoft.com/office/powerpoint/2010/main" val="2838274482"/>
+      </p:ext>
+    </p:extLst>
+  </p:cSld>
+  <p:clrMapOvr>
+    <a:masterClrMapping/>
+  </p:clrMapOvr>
+</p:sld>
+</file>
+
+<file path=ppt/slides/slide13.xml><?xml version="1.0" encoding="utf-8"?>
 <p:sld xmlns:a="http://schemas.openxmlformats.org/drawingml/2006/main" xmlns:r="http://schemas.openxmlformats.org/officeDocument/2006/relationships" xmlns:p="http://schemas.openxmlformats.org/presentationml/2006/main">
   <p:cSld>
     <p:spTree>
@@ -6966,7 +6986,7 @@
 </p:sld>
 </file>
 
-<file path=ppt/slides/slide13.xml><?xml version="1.0" encoding="utf-8"?>
+<file path=ppt/slides/slide14.xml><?xml version="1.0" encoding="utf-8"?>
 <p:sld xmlns:a="http://schemas.openxmlformats.org/drawingml/2006/main" xmlns:r="http://schemas.openxmlformats.org/officeDocument/2006/relationships" xmlns:p="http://schemas.openxmlformats.org/presentationml/2006/main">
   <p:cSld>
     <p:spTree>
@@ -7109,7 +7129,7 @@
 </p:sld>
 </file>
 
-<file path=ppt/slides/slide14.xml><?xml version="1.0" encoding="utf-8"?>
+<file path=ppt/slides/slide15.xml><?xml version="1.0" encoding="utf-8"?>
 <p:sld xmlns:a="http://schemas.openxmlformats.org/drawingml/2006/main" xmlns:r="http://schemas.openxmlformats.org/officeDocument/2006/relationships" xmlns:p="http://schemas.openxmlformats.org/presentationml/2006/main" show="0">
   <p:cSld>
     <p:spTree>
@@ -7311,7 +7331,7 @@
 </p:sld>
 </file>
 
-<file path=ppt/slides/slide15.xml><?xml version="1.0" encoding="utf-8"?>
+<file path=ppt/slides/slide16.xml><?xml version="1.0" encoding="utf-8"?>
 <p:sld xmlns:a="http://schemas.openxmlformats.org/drawingml/2006/main" xmlns:r="http://schemas.openxmlformats.org/officeDocument/2006/relationships" xmlns:p="http://schemas.openxmlformats.org/presentationml/2006/main">
   <p:cSld>
     <p:spTree>
@@ -7381,12 +7401,6 @@
           <a:p>
             <a:r>
               <a:rPr lang="en-US" sz="3200" dirty="0"/>
-              <a:t>This is preview; things will break!</a:t>
-            </a:r>
-          </a:p>
-          <a:p>
-            <a:r>
-              <a:rPr lang="en-US" sz="3200" dirty="0"/>
               <a:t>Setup Unit Tests because much easier than WriteLine debugging!</a:t>
             </a:r>
           </a:p>
@@ -7405,9 +7419,9 @@
               <a:rPr lang="en-US" sz="2000" dirty="0">
                 <a:hlinkClick r:id="rId2"/>
               </a:rPr>
-              <a:t>https://docs.microsoft.com/en-us/aspnet/core/blazor/?view=aspnetcore-3.0</a:t>
-            </a:r>
-            <a:endParaRPr lang="en-US" sz="3200" dirty="0"/>
+              <a:t>https://docs.microsoft.com/en-us/aspnet/core/blazor/?view=aspnetcore-3.1</a:t>
+            </a:r>
+            <a:endParaRPr lang="en-US" sz="2000" dirty="0"/>
           </a:p>
         </p:txBody>
       </p:sp>
@@ -7424,7 +7438,7 @@
 </p:sld>
 </file>
 
-<file path=ppt/slides/slide16.xml><?xml version="1.0" encoding="utf-8"?>
+<file path=ppt/slides/slide17.xml><?xml version="1.0" encoding="utf-8"?>
 <p:sld xmlns:a="http://schemas.openxmlformats.org/drawingml/2006/main" xmlns:r="http://schemas.openxmlformats.org/officeDocument/2006/relationships" xmlns:p="http://schemas.openxmlformats.org/presentationml/2006/main">
   <p:cSld>
     <p:spTree>
@@ -7507,7 +7521,7 @@
 </p:sld>
 </file>
 
-<file path=ppt/slides/slide17.xml><?xml version="1.0" encoding="utf-8"?>
+<file path=ppt/slides/slide18.xml><?xml version="1.0" encoding="utf-8"?>
 <p:sld xmlns:a="http://schemas.openxmlformats.org/drawingml/2006/main" xmlns:r="http://schemas.openxmlformats.org/officeDocument/2006/relationships" xmlns:p="http://schemas.openxmlformats.org/presentationml/2006/main">
   <p:cSld>
     <p:spTree>
@@ -9410,7 +9424,7 @@
             </a:pPr>
             <a:r>
               <a:rPr lang="en-US" sz="2000" dirty="0"/>
-              <a:t>This represents 87% of the market and shows the top 10 browsers and their active versions</a:t>
+              <a:t>This represents 92% of the market and shows the top 10 browsers and their active versions</a:t>
             </a:r>
           </a:p>
           <a:p>
@@ -9426,10 +9440,10 @@
       </p:sp>
       <p:pic>
         <p:nvPicPr>
-          <p:cNvPr id="5" name="Picture 4">
+          <p:cNvPr id="6" name="Picture 5">
             <a:extLst>
               <a:ext uri="{FF2B5EF4-FFF2-40B4-BE49-F238E27FC236}">
-                <a16:creationId xmlns:a16="http://schemas.microsoft.com/office/drawing/2014/main" id="{5D6F2633-DD1A-449C-A5DD-465F478E3BB3}"/>
+                <a16:creationId xmlns:a16="http://schemas.microsoft.com/office/drawing/2014/main" id="{C4DC2777-1FC5-4A4E-9BD5-A3D366E62B59}"/>
               </a:ext>
             </a:extLst>
           </p:cNvPr>
@@ -9446,8 +9460,8 @@
         </p:blipFill>
         <p:spPr>
           <a:xfrm>
-            <a:off x="284086" y="3762336"/>
-            <a:ext cx="11623828" cy="2574840"/>
+            <a:off x="176666" y="3660995"/>
+            <a:ext cx="11848245" cy="2667504"/>
           </a:xfrm>
           <a:prstGeom prst="rect">
             <a:avLst/>
@@ -9507,15 +9521,7 @@
           <a:p>
             <a:r>
               <a:rPr lang="en-US" dirty="0"/>
-              <a:t>What do you get with </a:t>
-            </a:r>
-            <a:r>
-              <a:rPr lang="en-US" dirty="0" err="1"/>
-              <a:t>.net</a:t>
-            </a:r>
-            <a:r>
-              <a:rPr lang="en-US" dirty="0"/>
-              <a:t> core 3.0 (Sept 23)?</a:t>
+              <a:t>What do you get with BLAZOR SERVER</a:t>
             </a:r>
           </a:p>
         </p:txBody>
@@ -12505,8 +12511,13 @@
           <a:p>
             <a:r>
               <a:rPr lang="en-US" dirty="0"/>
-              <a:t>then later this year</a:t>
-            </a:r>
+              <a:t>What do you get with BLAZOR </a:t>
+            </a:r>
+            <a:r>
+              <a:rPr lang="en-US" dirty="0" err="1"/>
+              <a:t>clientside</a:t>
+            </a:r>
+            <a:endParaRPr lang="en-US" dirty="0"/>
           </a:p>
         </p:txBody>
       </p:sp>

</xml_diff>